<commit_message>
Social Media Analyse Umfrage I
</commit_message>
<xml_diff>
--- a/documents/marketing/Marketing Analyse von Umfrage 1 Fokus Social Media (5.7).pptx
+++ b/documents/marketing/Marketing Analyse von Umfrage 1 Fokus Social Media (5.7).pptx
@@ -5,7 +5,7 @@
     <p:sldMasterId id="2147483648" r:id="rId1"/>
   </p:sldMasterIdLst>
   <p:notesMasterIdLst>
-    <p:notesMasterId r:id="rId20"/>
+    <p:notesMasterId r:id="rId19"/>
   </p:notesMasterIdLst>
   <p:sldIdLst>
     <p:sldId id="256" r:id="rId2"/>
@@ -25,7 +25,6 @@
     <p:sldId id="302" r:id="rId16"/>
     <p:sldId id="304" r:id="rId17"/>
     <p:sldId id="319" r:id="rId18"/>
-    <p:sldId id="258" r:id="rId19"/>
   </p:sldIdLst>
   <p:sldSz cx="9144000" cy="6858000" type="screen4x3"/>
   <p:notesSz cx="6858000" cy="9144000"/>
@@ -158,7 +157,6 @@
         <p14:section name="Erkenntnisse" id="{1F5D3F0E-2E10-417D-B3B3-F875A4E86560}">
           <p14:sldIdLst>
             <p14:sldId id="319"/>
-            <p14:sldId id="258"/>
           </p14:sldIdLst>
         </p14:section>
       </p14:sectionLst>
@@ -6070,11 +6068,11 @@
               <a:t>Empfehlungen </a:t>
             </a:r>
             <a:r>
-              <a:rPr lang="de-DE" sz="1500" dirty="0">
-                <a:latin typeface="Arial" panose="020B0604020202020204" pitchFamily="34" charset="0"/>
-                <a:cs typeface="Arial" panose="020B0604020202020204" pitchFamily="34" charset="0"/>
-              </a:rPr>
-              <a:t>mit Freunden zu </a:t>
+              <a:rPr lang="de-DE" sz="1500" dirty="0" smtClean="0">
+                <a:latin typeface="Arial" panose="020B0604020202020204" pitchFamily="34" charset="0"/>
+                <a:cs typeface="Arial" panose="020B0604020202020204" pitchFamily="34" charset="0"/>
+              </a:rPr>
+              <a:t>über Social Media zu </a:t>
             </a:r>
             <a:r>
               <a:rPr lang="de-DE" sz="1500" dirty="0" smtClean="0">
@@ -6648,7 +6646,7 @@
                 <a:latin typeface="Arial" panose="020B0604020202020204" pitchFamily="34" charset="0"/>
                 <a:cs typeface="Arial" panose="020B0604020202020204" pitchFamily="34" charset="0"/>
               </a:rPr>
-              <a:t>Gesamt: 1 (0,0%), 2-4 (56,8%), 5-7 (38,5%), 7&lt; (4,7%)</a:t>
+              <a:t>Gesamtergebnisse Q4: 1 (0,0%), 2-4 (56,8%), 5-7 (38,5%), 7&lt; (4,7%)</a:t>
             </a:r>
           </a:p>
           <a:p>
@@ -6658,7 +6656,7 @@
                 <a:latin typeface="Arial" panose="020B0604020202020204" pitchFamily="34" charset="0"/>
                 <a:cs typeface="Arial" panose="020B0604020202020204" pitchFamily="34" charset="0"/>
               </a:rPr>
-              <a:t>Bei den Teilnehmern die Angegeben haben ihre Informationen über Social Media zu beziehen, ist eine leichte Tendenz in Richtung größerer Gruppen zu erkennen.</a:t>
+              <a:t>Bei den Teilnehmern die Angegeben haben ihre Informationen über Social Media zu beziehen, ist eine leichte Tendenz in Richtung größerer Gruppen zu erkennen. Dies ist aber nicht signifikant.</a:t>
             </a:r>
             <a:endParaRPr lang="de-DE" sz="1600" dirty="0">
               <a:latin typeface="Arial" panose="020B0604020202020204" pitchFamily="34" charset="0"/>
@@ -7279,11 +7277,35 @@
           <a:p>
             <a:pPr marL="720725" indent="-274638"/>
             <a:r>
+              <a:rPr lang="de-DE" sz="1600" dirty="0">
+                <a:latin typeface="Arial" panose="020B0604020202020204" pitchFamily="34" charset="0"/>
+                <a:cs typeface="Arial" panose="020B0604020202020204" pitchFamily="34" charset="0"/>
+              </a:rPr>
+              <a:t>Gesamtergebnisse </a:t>
+            </a:r>
+            <a:r>
               <a:rPr lang="de-DE" sz="1600" dirty="0" smtClean="0">
                 <a:latin typeface="Arial" panose="020B0604020202020204" pitchFamily="34" charset="0"/>
                 <a:cs typeface="Arial" panose="020B0604020202020204" pitchFamily="34" charset="0"/>
               </a:rPr>
-              <a:t>Gesamt: Ja (88,0%), Nein (12,0%)</a:t>
+              <a:t>Q7: </a:t>
+            </a:r>
+            <a:r>
+              <a:rPr lang="de-DE" sz="1600" dirty="0" smtClean="0">
+                <a:latin typeface="Arial" panose="020B0604020202020204" pitchFamily="34" charset="0"/>
+                <a:cs typeface="Arial" panose="020B0604020202020204" pitchFamily="34" charset="0"/>
+              </a:rPr>
+              <a:t>Ja (88,0%), Nein (12,0%)</a:t>
+            </a:r>
+          </a:p>
+          <a:p>
+            <a:pPr marL="720725" indent="-274638"/>
+            <a:r>
+              <a:rPr lang="de-DE" sz="1600" dirty="0" smtClean="0">
+                <a:latin typeface="Arial" panose="020B0604020202020204" pitchFamily="34" charset="0"/>
+                <a:cs typeface="Arial" panose="020B0604020202020204" pitchFamily="34" charset="0"/>
+              </a:rPr>
+              <a:t>Die Verteilung bei dieser Kreuztabelle ist nahezu identisch mit der Gesamtverteilung.</a:t>
             </a:r>
             <a:endParaRPr lang="de-DE" sz="1600" dirty="0">
               <a:latin typeface="Arial" panose="020B0604020202020204" pitchFamily="34" charset="0"/>
@@ -7858,7 +7880,21 @@
                 <a:latin typeface="Arial" panose="020B0604020202020204" pitchFamily="34" charset="0"/>
                 <a:cs typeface="Arial" panose="020B0604020202020204" pitchFamily="34" charset="0"/>
               </a:rPr>
-              <a:t>Gesamt: Ja </a:t>
+              <a:t>Gesamtergebnisse </a:t>
+            </a:r>
+            <a:r>
+              <a:rPr lang="de-DE" sz="1600" dirty="0" smtClean="0">
+                <a:latin typeface="Arial" panose="020B0604020202020204" pitchFamily="34" charset="0"/>
+                <a:cs typeface="Arial" panose="020B0604020202020204" pitchFamily="34" charset="0"/>
+              </a:rPr>
+              <a:t>Q9: </a:t>
+            </a:r>
+            <a:r>
+              <a:rPr lang="de-DE" sz="1600" dirty="0">
+                <a:latin typeface="Arial" panose="020B0604020202020204" pitchFamily="34" charset="0"/>
+                <a:cs typeface="Arial" panose="020B0604020202020204" pitchFamily="34" charset="0"/>
+              </a:rPr>
+              <a:t>Ja </a:t>
             </a:r>
             <a:r>
               <a:rPr lang="de-DE" sz="1600" dirty="0" smtClean="0">
@@ -8468,13 +8504,27 @@
                 <a:latin typeface="Arial" panose="020B0604020202020204" pitchFamily="34" charset="0"/>
                 <a:cs typeface="Arial" panose="020B0604020202020204" pitchFamily="34" charset="0"/>
               </a:rPr>
-              <a:t>Gesamt: Ja </a:t>
+              <a:t>Gesamtergebnisse </a:t>
             </a:r>
             <a:r>
               <a:rPr lang="de-DE" sz="1600" dirty="0" smtClean="0">
                 <a:latin typeface="Arial" panose="020B0604020202020204" pitchFamily="34" charset="0"/>
                 <a:cs typeface="Arial" panose="020B0604020202020204" pitchFamily="34" charset="0"/>
               </a:rPr>
+              <a:t>Q13: </a:t>
+            </a:r>
+            <a:r>
+              <a:rPr lang="de-DE" sz="1600" dirty="0">
+                <a:latin typeface="Arial" panose="020B0604020202020204" pitchFamily="34" charset="0"/>
+                <a:cs typeface="Arial" panose="020B0604020202020204" pitchFamily="34" charset="0"/>
+              </a:rPr>
+              <a:t>Ja </a:t>
+            </a:r>
+            <a:r>
+              <a:rPr lang="de-DE" sz="1600" dirty="0" smtClean="0">
+                <a:latin typeface="Arial" panose="020B0604020202020204" pitchFamily="34" charset="0"/>
+                <a:cs typeface="Arial" panose="020B0604020202020204" pitchFamily="34" charset="0"/>
+              </a:rPr>
               <a:t>(26,0%), </a:t>
             </a:r>
             <a:r>
@@ -8491,6 +8541,19 @@
               </a:rPr>
               <a:t>(10,9%), Ab und zu (63,0%)</a:t>
             </a:r>
+          </a:p>
+          <a:p>
+            <a:pPr marL="720725" indent="-274638"/>
+            <a:r>
+              <a:rPr lang="de-DE" sz="1600" dirty="0">
+                <a:latin typeface="Arial" panose="020B0604020202020204" pitchFamily="34" charset="0"/>
+                <a:cs typeface="Arial" panose="020B0604020202020204" pitchFamily="34" charset="0"/>
+              </a:rPr>
+              <a:t>Die Verteilung bei dieser Kreuztabelle ist nahezu identisch mit der Gesamtverteilung.</a:t>
+            </a:r>
+          </a:p>
+          <a:p>
+            <a:pPr marL="720725" indent="-274638"/>
             <a:endParaRPr lang="de-DE" sz="1600" dirty="0">
               <a:latin typeface="Arial" panose="020B0604020202020204" pitchFamily="34" charset="0"/>
               <a:cs typeface="Arial" panose="020B0604020202020204" pitchFamily="34" charset="0"/>
@@ -9071,7 +9134,21 @@
                 <a:latin typeface="Arial" panose="020B0604020202020204" pitchFamily="34" charset="0"/>
                 <a:cs typeface="Arial" panose="020B0604020202020204" pitchFamily="34" charset="0"/>
               </a:rPr>
-              <a:t>Gesamt: Ja </a:t>
+              <a:t>Gesamtergebnisse </a:t>
+            </a:r>
+            <a:r>
+              <a:rPr lang="de-DE" sz="1600" dirty="0" smtClean="0">
+                <a:latin typeface="Arial" panose="020B0604020202020204" pitchFamily="34" charset="0"/>
+                <a:cs typeface="Arial" panose="020B0604020202020204" pitchFamily="34" charset="0"/>
+              </a:rPr>
+              <a:t>Q14: </a:t>
+            </a:r>
+            <a:r>
+              <a:rPr lang="de-DE" sz="1600" dirty="0">
+                <a:latin typeface="Arial" panose="020B0604020202020204" pitchFamily="34" charset="0"/>
+                <a:cs typeface="Arial" panose="020B0604020202020204" pitchFamily="34" charset="0"/>
+              </a:rPr>
+              <a:t>Ja </a:t>
             </a:r>
             <a:r>
               <a:rPr lang="de-DE" sz="1600" dirty="0" smtClean="0">
@@ -9697,13 +9774,27 @@
                 <a:latin typeface="Arial" panose="020B0604020202020204" pitchFamily="34" charset="0"/>
                 <a:cs typeface="Arial" panose="020B0604020202020204" pitchFamily="34" charset="0"/>
               </a:rPr>
-              <a:t>Gesamt: Ja </a:t>
+              <a:t>Gesamtergebnisse </a:t>
             </a:r>
             <a:r>
               <a:rPr lang="de-DE" sz="1600" dirty="0" smtClean="0">
                 <a:latin typeface="Arial" panose="020B0604020202020204" pitchFamily="34" charset="0"/>
                 <a:cs typeface="Arial" panose="020B0604020202020204" pitchFamily="34" charset="0"/>
               </a:rPr>
+              <a:t>Q16: </a:t>
+            </a:r>
+            <a:r>
+              <a:rPr lang="de-DE" sz="1600" dirty="0">
+                <a:latin typeface="Arial" panose="020B0604020202020204" pitchFamily="34" charset="0"/>
+                <a:cs typeface="Arial" panose="020B0604020202020204" pitchFamily="34" charset="0"/>
+              </a:rPr>
+              <a:t>Ja </a:t>
+            </a:r>
+            <a:r>
+              <a:rPr lang="de-DE" sz="1600" dirty="0" smtClean="0">
+                <a:latin typeface="Arial" panose="020B0604020202020204" pitchFamily="34" charset="0"/>
+                <a:cs typeface="Arial" panose="020B0604020202020204" pitchFamily="34" charset="0"/>
+              </a:rPr>
               <a:t>(31,8%), </a:t>
             </a:r>
             <a:r>
@@ -9720,6 +9811,33 @@
               </a:rPr>
               <a:t>(68,2%)</a:t>
             </a:r>
+          </a:p>
+          <a:p>
+            <a:pPr marL="720725" indent="-274638"/>
+            <a:r>
+              <a:rPr lang="de-DE" sz="1600" dirty="0">
+                <a:latin typeface="Arial" panose="020B0604020202020204" pitchFamily="34" charset="0"/>
+                <a:cs typeface="Arial" panose="020B0604020202020204" pitchFamily="34" charset="0"/>
+              </a:rPr>
+              <a:t>„Ja“ ist um </a:t>
+            </a:r>
+            <a:r>
+              <a:rPr lang="de-DE" sz="1600" dirty="0" smtClean="0">
+                <a:latin typeface="Arial" panose="020B0604020202020204" pitchFamily="34" charset="0"/>
+                <a:cs typeface="Arial" panose="020B0604020202020204" pitchFamily="34" charset="0"/>
+              </a:rPr>
+              <a:t>3,25% geringer </a:t>
+            </a:r>
+            <a:r>
+              <a:rPr lang="de-DE" sz="1600" dirty="0">
+                <a:latin typeface="Arial" panose="020B0604020202020204" pitchFamily="34" charset="0"/>
+                <a:cs typeface="Arial" panose="020B0604020202020204" pitchFamily="34" charset="0"/>
+              </a:rPr>
+              <a:t>bei den Teilnehmern die angegeben haben Informationen über Social Media zu beziehen.</a:t>
+            </a:r>
+          </a:p>
+          <a:p>
+            <a:pPr marL="720725" indent="-274638"/>
             <a:endParaRPr lang="de-DE" sz="1600" dirty="0">
               <a:latin typeface="Arial" panose="020B0604020202020204" pitchFamily="34" charset="0"/>
               <a:cs typeface="Arial" panose="020B0604020202020204" pitchFamily="34" charset="0"/>
@@ -10257,6 +10375,290 @@
             </a:endParaRPr>
           </a:p>
           <a:p>
+            <a:r>
+              <a:rPr lang="de-DE" sz="1600" dirty="0" smtClean="0">
+                <a:latin typeface="Arial" panose="020B0604020202020204" pitchFamily="34" charset="0"/>
+                <a:cs typeface="Arial" panose="020B0604020202020204" pitchFamily="34" charset="0"/>
+              </a:rPr>
+              <a:t>Mehr als 50% der Befragten geben an Social Media als Informationsquelle zu nutzen. Die </a:t>
+            </a:r>
+            <a:r>
+              <a:rPr lang="de-DE" sz="1600" dirty="0">
+                <a:latin typeface="Arial" panose="020B0604020202020204" pitchFamily="34" charset="0"/>
+                <a:cs typeface="Arial" panose="020B0604020202020204" pitchFamily="34" charset="0"/>
+              </a:rPr>
+              <a:t>geplante Sharing-Funktion unterstützt die Möglichkeit über eigene Routen persönliche </a:t>
+            </a:r>
+            <a:r>
+              <a:rPr lang="de-DE" sz="1600" dirty="0" smtClean="0">
+                <a:latin typeface="Arial" panose="020B0604020202020204" pitchFamily="34" charset="0"/>
+                <a:cs typeface="Arial" panose="020B0604020202020204" pitchFamily="34" charset="0"/>
+              </a:rPr>
+              <a:t>Empfehlungen über Social Media zu </a:t>
+            </a:r>
+            <a:r>
+              <a:rPr lang="de-DE" sz="1600" dirty="0">
+                <a:latin typeface="Arial" panose="020B0604020202020204" pitchFamily="34" charset="0"/>
+                <a:cs typeface="Arial" panose="020B0604020202020204" pitchFamily="34" charset="0"/>
+              </a:rPr>
+              <a:t>teilen. Außerdem zeigt es die Wichtigkeit diesen Kanal als Werbekanal zu nutzen</a:t>
+            </a:r>
+            <a:r>
+              <a:rPr lang="de-DE" sz="1600" dirty="0" smtClean="0">
+                <a:latin typeface="Arial" panose="020B0604020202020204" pitchFamily="34" charset="0"/>
+                <a:cs typeface="Arial" panose="020B0604020202020204" pitchFamily="34" charset="0"/>
+              </a:rPr>
+              <a:t>. (</a:t>
+            </a:r>
+            <a:r>
+              <a:rPr lang="de-DE" sz="1600" dirty="0" smtClean="0">
+                <a:latin typeface="Arial" panose="020B0604020202020204" pitchFamily="34" charset="0"/>
+                <a:cs typeface="Arial" panose="020B0604020202020204" pitchFamily="34" charset="0"/>
+                <a:hlinkClick r:id="rId2" action="ppaction://hlinksldjump"/>
+              </a:rPr>
+              <a:t>Folie 10</a:t>
+            </a:r>
+            <a:r>
+              <a:rPr lang="de-DE" sz="1600" dirty="0" smtClean="0">
+                <a:latin typeface="Arial" panose="020B0604020202020204" pitchFamily="34" charset="0"/>
+                <a:cs typeface="Arial" panose="020B0604020202020204" pitchFamily="34" charset="0"/>
+              </a:rPr>
+              <a:t>)</a:t>
+            </a:r>
+          </a:p>
+          <a:p>
+            <a:r>
+              <a:rPr lang="de-DE" sz="1600" dirty="0">
+                <a:latin typeface="Arial" panose="020B0604020202020204" pitchFamily="34" charset="0"/>
+                <a:cs typeface="Arial" panose="020B0604020202020204" pitchFamily="34" charset="0"/>
+              </a:rPr>
+              <a:t>Bei den Teilnehmern die Angegeben haben ihre Informationen über Social Media zu beziehen, ist eine leichte Tendenz in Richtung größerer Gruppen zu erkennen. Dies ist aber </a:t>
+            </a:r>
+            <a:r>
+              <a:rPr lang="de-DE" sz="1600" dirty="0" smtClean="0">
+                <a:latin typeface="Arial" panose="020B0604020202020204" pitchFamily="34" charset="0"/>
+                <a:cs typeface="Arial" panose="020B0604020202020204" pitchFamily="34" charset="0"/>
+              </a:rPr>
+              <a:t>nicht signifikant. (</a:t>
+            </a:r>
+            <a:r>
+              <a:rPr lang="de-DE" sz="1600" dirty="0" smtClean="0">
+                <a:latin typeface="Arial" panose="020B0604020202020204" pitchFamily="34" charset="0"/>
+                <a:cs typeface="Arial" panose="020B0604020202020204" pitchFamily="34" charset="0"/>
+                <a:hlinkClick r:id="rId3" action="ppaction://hlinksldjump"/>
+              </a:rPr>
+              <a:t>Folie 11</a:t>
+            </a:r>
+            <a:r>
+              <a:rPr lang="de-DE" sz="1600" dirty="0" smtClean="0">
+                <a:latin typeface="Arial" panose="020B0604020202020204" pitchFamily="34" charset="0"/>
+                <a:cs typeface="Arial" panose="020B0604020202020204" pitchFamily="34" charset="0"/>
+              </a:rPr>
+              <a:t>)</a:t>
+            </a:r>
+          </a:p>
+          <a:p>
+            <a:r>
+              <a:rPr lang="de-DE" sz="1600" dirty="0" smtClean="0">
+                <a:latin typeface="Arial" panose="020B0604020202020204" pitchFamily="34" charset="0"/>
+                <a:cs typeface="Arial" panose="020B0604020202020204" pitchFamily="34" charset="0"/>
+              </a:rPr>
+              <a:t>Teilnehmer die ihre Informationen über Social Media beziehen, gehen tendenziell mehr als die Gesamtverteilung in mehr als eine Location  pro Abend. </a:t>
+            </a:r>
+            <a:r>
+              <a:rPr lang="de-DE" sz="1600" dirty="0">
+                <a:latin typeface="Arial" panose="020B0604020202020204" pitchFamily="34" charset="0"/>
+                <a:cs typeface="Arial" panose="020B0604020202020204" pitchFamily="34" charset="0"/>
+              </a:rPr>
+              <a:t>Dies ist aber nicht </a:t>
+            </a:r>
+            <a:r>
+              <a:rPr lang="de-DE" sz="1600" dirty="0" smtClean="0">
+                <a:latin typeface="Arial" panose="020B0604020202020204" pitchFamily="34" charset="0"/>
+                <a:cs typeface="Arial" panose="020B0604020202020204" pitchFamily="34" charset="0"/>
+              </a:rPr>
+              <a:t>signifikant. (</a:t>
+            </a:r>
+            <a:r>
+              <a:rPr lang="de-DE" sz="1600" dirty="0" smtClean="0">
+                <a:latin typeface="Arial" panose="020B0604020202020204" pitchFamily="34" charset="0"/>
+                <a:cs typeface="Arial" panose="020B0604020202020204" pitchFamily="34" charset="0"/>
+                <a:hlinkClick r:id="rId4" action="ppaction://hlinksldjump"/>
+              </a:rPr>
+              <a:t>Folie 13</a:t>
+            </a:r>
+            <a:r>
+              <a:rPr lang="de-DE" sz="1600" dirty="0" smtClean="0">
+                <a:latin typeface="Arial" panose="020B0604020202020204" pitchFamily="34" charset="0"/>
+                <a:cs typeface="Arial" panose="020B0604020202020204" pitchFamily="34" charset="0"/>
+              </a:rPr>
+              <a:t>)</a:t>
+            </a:r>
+          </a:p>
+          <a:p>
+            <a:r>
+              <a:rPr lang="de-DE" sz="1600" dirty="0">
+                <a:latin typeface="Arial" panose="020B0604020202020204" pitchFamily="34" charset="0"/>
+                <a:cs typeface="Arial" panose="020B0604020202020204" pitchFamily="34" charset="0"/>
+              </a:rPr>
+              <a:t>Teilnehmer die ihre Informationen über Social Media </a:t>
+            </a:r>
+            <a:r>
+              <a:rPr lang="de-DE" sz="1600" dirty="0" smtClean="0">
+                <a:latin typeface="Arial" panose="020B0604020202020204" pitchFamily="34" charset="0"/>
+                <a:cs typeface="Arial" panose="020B0604020202020204" pitchFamily="34" charset="0"/>
+              </a:rPr>
+              <a:t>beziehen, sind tendenziell </a:t>
+            </a:r>
+            <a:r>
+              <a:rPr lang="de-DE" sz="1600" dirty="0">
+                <a:latin typeface="Arial" panose="020B0604020202020204" pitchFamily="34" charset="0"/>
+                <a:cs typeface="Arial" panose="020B0604020202020204" pitchFamily="34" charset="0"/>
+              </a:rPr>
+              <a:t>mehr als die Gesamtverteilung </a:t>
+            </a:r>
+            <a:r>
+              <a:rPr lang="de-DE" sz="1600" dirty="0" smtClean="0">
+                <a:latin typeface="Arial" panose="020B0604020202020204" pitchFamily="34" charset="0"/>
+                <a:cs typeface="Arial" panose="020B0604020202020204" pitchFamily="34" charset="0"/>
+              </a:rPr>
+              <a:t>bereit eine vordefinierte Happy Hour Route zu nutzen. </a:t>
+            </a:r>
+            <a:r>
+              <a:rPr lang="de-DE" sz="1600" dirty="0">
+                <a:latin typeface="Arial" panose="020B0604020202020204" pitchFamily="34" charset="0"/>
+                <a:cs typeface="Arial" panose="020B0604020202020204" pitchFamily="34" charset="0"/>
+              </a:rPr>
+              <a:t>(</a:t>
+            </a:r>
+            <a:r>
+              <a:rPr lang="de-DE" sz="1600" dirty="0">
+                <a:latin typeface="Arial" panose="020B0604020202020204" pitchFamily="34" charset="0"/>
+                <a:cs typeface="Arial" panose="020B0604020202020204" pitchFamily="34" charset="0"/>
+                <a:hlinkClick r:id="rId5" action="ppaction://hlinksldjump"/>
+              </a:rPr>
+              <a:t>Folie </a:t>
+            </a:r>
+            <a:r>
+              <a:rPr lang="de-DE" sz="1600" dirty="0" smtClean="0">
+                <a:latin typeface="Arial" panose="020B0604020202020204" pitchFamily="34" charset="0"/>
+                <a:cs typeface="Arial" panose="020B0604020202020204" pitchFamily="34" charset="0"/>
+                <a:hlinkClick r:id="rId5" action="ppaction://hlinksldjump"/>
+              </a:rPr>
+              <a:t>15</a:t>
+            </a:r>
+            <a:r>
+              <a:rPr lang="de-DE" sz="1600" dirty="0" smtClean="0">
+                <a:latin typeface="Arial" panose="020B0604020202020204" pitchFamily="34" charset="0"/>
+                <a:cs typeface="Arial" panose="020B0604020202020204" pitchFamily="34" charset="0"/>
+              </a:rPr>
+              <a:t>)</a:t>
+            </a:r>
+          </a:p>
+          <a:p>
+            <a:r>
+              <a:rPr lang="de-DE" sz="1600" dirty="0">
+                <a:latin typeface="Arial" panose="020B0604020202020204" pitchFamily="34" charset="0"/>
+                <a:cs typeface="Arial" panose="020B0604020202020204" pitchFamily="34" charset="0"/>
+              </a:rPr>
+              <a:t>Teilnehmer die ihre Informationen über Social Media beziehen, sind tendenziell </a:t>
+            </a:r>
+            <a:r>
+              <a:rPr lang="de-DE" sz="1600" dirty="0" smtClean="0">
+                <a:latin typeface="Arial" panose="020B0604020202020204" pitchFamily="34" charset="0"/>
+                <a:cs typeface="Arial" panose="020B0604020202020204" pitchFamily="34" charset="0"/>
+              </a:rPr>
+              <a:t>weniger </a:t>
+            </a:r>
+            <a:r>
+              <a:rPr lang="de-DE" sz="1600" dirty="0">
+                <a:latin typeface="Arial" panose="020B0604020202020204" pitchFamily="34" charset="0"/>
+                <a:cs typeface="Arial" panose="020B0604020202020204" pitchFamily="34" charset="0"/>
+              </a:rPr>
+              <a:t>als die Gesamtverteilung bereit eine </a:t>
+            </a:r>
+            <a:r>
+              <a:rPr lang="de-DE" sz="1600" dirty="0" smtClean="0">
+                <a:latin typeface="Arial" panose="020B0604020202020204" pitchFamily="34" charset="0"/>
+                <a:cs typeface="Arial" panose="020B0604020202020204" pitchFamily="34" charset="0"/>
+              </a:rPr>
+              <a:t>Happy </a:t>
+            </a:r>
+            <a:r>
+              <a:rPr lang="de-DE" sz="1600" dirty="0">
+                <a:latin typeface="Arial" panose="020B0604020202020204" pitchFamily="34" charset="0"/>
+                <a:cs typeface="Arial" panose="020B0604020202020204" pitchFamily="34" charset="0"/>
+              </a:rPr>
+              <a:t>Hour Route </a:t>
+            </a:r>
+            <a:r>
+              <a:rPr lang="de-DE" sz="1600" dirty="0" smtClean="0">
+                <a:latin typeface="Arial" panose="020B0604020202020204" pitchFamily="34" charset="0"/>
+                <a:cs typeface="Arial" panose="020B0604020202020204" pitchFamily="34" charset="0"/>
+              </a:rPr>
+              <a:t>selber zu erstellen. </a:t>
+            </a:r>
+            <a:r>
+              <a:rPr lang="de-DE" sz="1600" dirty="0">
+                <a:latin typeface="Arial" panose="020B0604020202020204" pitchFamily="34" charset="0"/>
+                <a:cs typeface="Arial" panose="020B0604020202020204" pitchFamily="34" charset="0"/>
+              </a:rPr>
+              <a:t>Dies ist aber nicht </a:t>
+            </a:r>
+            <a:r>
+              <a:rPr lang="de-DE" sz="1600" dirty="0" smtClean="0">
+                <a:latin typeface="Arial" panose="020B0604020202020204" pitchFamily="34" charset="0"/>
+                <a:cs typeface="Arial" panose="020B0604020202020204" pitchFamily="34" charset="0"/>
+              </a:rPr>
+              <a:t>signifikant. (</a:t>
+            </a:r>
+            <a:r>
+              <a:rPr lang="de-DE" sz="1600" dirty="0">
+                <a:latin typeface="Arial" panose="020B0604020202020204" pitchFamily="34" charset="0"/>
+                <a:cs typeface="Arial" panose="020B0604020202020204" pitchFamily="34" charset="0"/>
+                <a:hlinkClick r:id="rId6" action="ppaction://hlinksldjump"/>
+              </a:rPr>
+              <a:t>Folie </a:t>
+            </a:r>
+            <a:r>
+              <a:rPr lang="de-DE" sz="1600" dirty="0" smtClean="0">
+                <a:latin typeface="Arial" panose="020B0604020202020204" pitchFamily="34" charset="0"/>
+                <a:cs typeface="Arial" panose="020B0604020202020204" pitchFamily="34" charset="0"/>
+                <a:hlinkClick r:id="rId6" action="ppaction://hlinksldjump"/>
+              </a:rPr>
+              <a:t>16</a:t>
+            </a:r>
+            <a:r>
+              <a:rPr lang="de-DE" sz="1600" dirty="0" smtClean="0">
+                <a:latin typeface="Arial" panose="020B0604020202020204" pitchFamily="34" charset="0"/>
+                <a:cs typeface="Arial" panose="020B0604020202020204" pitchFamily="34" charset="0"/>
+              </a:rPr>
+              <a:t>)</a:t>
+            </a:r>
+            <a:endParaRPr lang="de-DE" sz="1600" dirty="0">
+              <a:latin typeface="Arial" panose="020B0604020202020204" pitchFamily="34" charset="0"/>
+              <a:cs typeface="Arial" panose="020B0604020202020204" pitchFamily="34" charset="0"/>
+            </a:endParaRPr>
+          </a:p>
+          <a:p>
+            <a:endParaRPr lang="de-DE" sz="1600" dirty="0">
+              <a:latin typeface="Arial" panose="020B0604020202020204" pitchFamily="34" charset="0"/>
+              <a:cs typeface="Arial" panose="020B0604020202020204" pitchFamily="34" charset="0"/>
+            </a:endParaRPr>
+          </a:p>
+          <a:p>
+            <a:endParaRPr lang="de-DE" sz="1600" dirty="0">
+              <a:latin typeface="Arial" panose="020B0604020202020204" pitchFamily="34" charset="0"/>
+              <a:cs typeface="Arial" panose="020B0604020202020204" pitchFamily="34" charset="0"/>
+            </a:endParaRPr>
+          </a:p>
+          <a:p>
+            <a:endParaRPr lang="de-DE" sz="1600" dirty="0">
+              <a:latin typeface="Arial" panose="020B0604020202020204" pitchFamily="34" charset="0"/>
+              <a:cs typeface="Arial" panose="020B0604020202020204" pitchFamily="34" charset="0"/>
+            </a:endParaRPr>
+          </a:p>
+          <a:p>
             <a:endParaRPr lang="de-DE" sz="1600" dirty="0">
               <a:latin typeface="Arial" panose="020B0604020202020204" pitchFamily="34" charset="0"/>
               <a:cs typeface="Arial" panose="020B0604020202020204" pitchFamily="34" charset="0"/>
@@ -10466,385 +10868,6 @@
     <p:extLst>
       <p:ext uri="{BB962C8B-B14F-4D97-AF65-F5344CB8AC3E}">
         <p14:creationId xmlns:p14="http://schemas.microsoft.com/office/powerpoint/2010/main" val="2964199789"/>
-      </p:ext>
-    </p:extLst>
-  </p:cSld>
-  <p:clrMapOvr>
-    <a:masterClrMapping/>
-  </p:clrMapOvr>
-  <p:timing>
-    <p:tnLst>
-      <p:par>
-        <p:cTn id="1" dur="indefinite" restart="never" nodeType="tmRoot"/>
-      </p:par>
-    </p:tnLst>
-  </p:timing>
-</p:sld>
-</file>
-
-<file path=ppt/slides/slide18.xml><?xml version="1.0" encoding="utf-8"?>
-<p:sld xmlns:a="http://schemas.openxmlformats.org/drawingml/2006/main" xmlns:r="http://schemas.openxmlformats.org/officeDocument/2006/relationships" xmlns:p="http://schemas.openxmlformats.org/presentationml/2006/main">
-  <p:cSld>
-    <p:spTree>
-      <p:nvGrpSpPr>
-        <p:cNvPr id="1" name=""/>
-        <p:cNvGrpSpPr/>
-        <p:nvPr/>
-      </p:nvGrpSpPr>
-      <p:grpSpPr>
-        <a:xfrm>
-          <a:off x="0" y="0"/>
-          <a:ext cx="0" cy="0"/>
-          <a:chOff x="0" y="0"/>
-          <a:chExt cx="0" cy="0"/>
-        </a:xfrm>
-      </p:grpSpPr>
-      <p:graphicFrame>
-        <p:nvGraphicFramePr>
-          <p:cNvPr id="4" name="Inhaltsplatzhalter 3"/>
-          <p:cNvGraphicFramePr>
-            <a:graphicFrameLocks noGrp="1"/>
-          </p:cNvGraphicFramePr>
-          <p:nvPr>
-            <p:ph idx="1"/>
-            <p:extLst>
-              <p:ext uri="{D42A27DB-BD31-4B8C-83A1-F6EECF244321}">
-                <p14:modId xmlns:p14="http://schemas.microsoft.com/office/powerpoint/2010/main" val="3348861530"/>
-              </p:ext>
-            </p:extLst>
-          </p:nvPr>
-        </p:nvGraphicFramePr>
-        <p:xfrm>
-          <a:off x="251520" y="1196752"/>
-          <a:ext cx="8568952" cy="5256582"/>
-        </p:xfrm>
-        <a:graphic>
-          <a:graphicData uri="http://schemas.openxmlformats.org/drawingml/2006/table">
-            <a:tbl>
-              <a:tblPr firstRow="1" bandRow="1">
-                <a:tableStyleId>{5C22544A-7EE6-4342-B048-85BDC9FD1C3A}</a:tableStyleId>
-              </a:tblPr>
-              <a:tblGrid>
-                <a:gridCol w="1885202"/>
-                <a:gridCol w="6683750"/>
-              </a:tblGrid>
-              <a:tr h="338362">
-                <a:tc>
-                  <a:txBody>
-                    <a:bodyPr/>
-                    <a:lstStyle/>
-                    <a:p>
-                      <a:r>
-                        <a:rPr lang="de-DE" sz="1600" dirty="0" smtClean="0">
-                          <a:latin typeface="Arial" panose="020B0604020202020204" pitchFamily="34" charset="0"/>
-                          <a:cs typeface="Arial" panose="020B0604020202020204" pitchFamily="34" charset="0"/>
-                        </a:rPr>
-                        <a:t>Team</a:t>
-                      </a:r>
-                      <a:endParaRPr lang="de-DE" sz="1600" dirty="0">
-                        <a:latin typeface="Arial" panose="020B0604020202020204" pitchFamily="34" charset="0"/>
-                        <a:cs typeface="Arial" panose="020B0604020202020204" pitchFamily="34" charset="0"/>
-                      </a:endParaRPr>
-                    </a:p>
-                  </a:txBody>
-                  <a:tcPr>
-                    <a:solidFill>
-                      <a:srgbClr val="3F51B5"/>
-                    </a:solidFill>
-                  </a:tcPr>
-                </a:tc>
-                <a:tc>
-                  <a:txBody>
-                    <a:bodyPr/>
-                    <a:lstStyle/>
-                    <a:p>
-                      <a:r>
-                        <a:rPr lang="de-DE" sz="1600" dirty="0" smtClean="0">
-                          <a:latin typeface="Arial" panose="020B0604020202020204" pitchFamily="34" charset="0"/>
-                          <a:cs typeface="Arial" panose="020B0604020202020204" pitchFamily="34" charset="0"/>
-                        </a:rPr>
-                        <a:t>Kommentar</a:t>
-                      </a:r>
-                      <a:endParaRPr lang="de-DE" sz="1600" dirty="0">
-                        <a:latin typeface="Arial" panose="020B0604020202020204" pitchFamily="34" charset="0"/>
-                        <a:cs typeface="Arial" panose="020B0604020202020204" pitchFamily="34" charset="0"/>
-                      </a:endParaRPr>
-                    </a:p>
-                  </a:txBody>
-                  <a:tcPr>
-                    <a:solidFill>
-                      <a:srgbClr val="3F51B5"/>
-                    </a:solidFill>
-                  </a:tcPr>
-                </a:tc>
-              </a:tr>
-              <a:tr h="1075308">
-                <a:tc>
-                  <a:txBody>
-                    <a:bodyPr/>
-                    <a:lstStyle/>
-                    <a:p>
-                      <a:r>
-                        <a:rPr lang="de-DE" sz="1600" dirty="0" smtClean="0">
-                          <a:latin typeface="Arial" panose="020B0604020202020204" pitchFamily="34" charset="0"/>
-                          <a:cs typeface="Arial" panose="020B0604020202020204" pitchFamily="34" charset="0"/>
-                        </a:rPr>
-                        <a:t>Marketing</a:t>
-                      </a:r>
-                      <a:endParaRPr lang="de-DE" sz="1600" dirty="0">
-                        <a:latin typeface="Arial" panose="020B0604020202020204" pitchFamily="34" charset="0"/>
-                        <a:cs typeface="Arial" panose="020B0604020202020204" pitchFamily="34" charset="0"/>
-                      </a:endParaRPr>
-                    </a:p>
-                  </a:txBody>
-                  <a:tcPr/>
-                </a:tc>
-                <a:tc>
-                  <a:txBody>
-                    <a:bodyPr/>
-                    <a:lstStyle/>
-                    <a:p>
-                      <a:pPr marL="285750" marR="0" indent="-285750" algn="l" defTabSz="914400" rtl="0" eaLnBrk="1" fontAlgn="auto" latinLnBrk="0" hangingPunct="1">
-                        <a:lnSpc>
-                          <a:spcPct val="100000"/>
-                        </a:lnSpc>
-                        <a:spcBef>
-                          <a:spcPts val="0"/>
-                        </a:spcBef>
-                        <a:spcAft>
-                          <a:spcPts val="0"/>
-                        </a:spcAft>
-                        <a:buClrTx/>
-                        <a:buSzTx/>
-                        <a:buFont typeface="Arial" panose="020B0604020202020204" pitchFamily="34" charset="0"/>
-                        <a:buChar char="•"/>
-                        <a:tabLst/>
-                        <a:defRPr/>
-                      </a:pPr>
-                      <a:endParaRPr lang="de-DE" sz="1600" dirty="0">
-                        <a:latin typeface="Arial" panose="020B0604020202020204" pitchFamily="34" charset="0"/>
-                        <a:cs typeface="Arial" panose="020B0604020202020204" pitchFamily="34" charset="0"/>
-                      </a:endParaRPr>
-                    </a:p>
-                  </a:txBody>
-                  <a:tcPr/>
-                </a:tc>
-              </a:tr>
-              <a:tr h="1360626">
-                <a:tc>
-                  <a:txBody>
-                    <a:bodyPr/>
-                    <a:lstStyle/>
-                    <a:p>
-                      <a:r>
-                        <a:rPr lang="de-DE" sz="1600" dirty="0" smtClean="0">
-                          <a:latin typeface="Arial" panose="020B0604020202020204" pitchFamily="34" charset="0"/>
-                          <a:cs typeface="Arial" panose="020B0604020202020204" pitchFamily="34" charset="0"/>
-                        </a:rPr>
-                        <a:t>Frontend</a:t>
-                      </a:r>
-                      <a:endParaRPr lang="de-DE" sz="1600" dirty="0">
-                        <a:latin typeface="Arial" panose="020B0604020202020204" pitchFamily="34" charset="0"/>
-                        <a:cs typeface="Arial" panose="020B0604020202020204" pitchFamily="34" charset="0"/>
-                      </a:endParaRPr>
-                    </a:p>
-                  </a:txBody>
-                  <a:tcPr/>
-                </a:tc>
-                <a:tc>
-                  <a:txBody>
-                    <a:bodyPr/>
-                    <a:lstStyle/>
-                    <a:p>
-                      <a:pPr marL="285750" indent="-285750">
-                        <a:buFont typeface="Arial" panose="020B0604020202020204" pitchFamily="34" charset="0"/>
-                        <a:buChar char="•"/>
-                      </a:pPr>
-                      <a:endParaRPr lang="de-DE" sz="1600" dirty="0">
-                        <a:latin typeface="Arial" panose="020B0604020202020204" pitchFamily="34" charset="0"/>
-                        <a:cs typeface="Arial" panose="020B0604020202020204" pitchFamily="34" charset="0"/>
-                      </a:endParaRPr>
-                    </a:p>
-                  </a:txBody>
-                  <a:tcPr/>
-                </a:tc>
-              </a:tr>
-              <a:tr h="1571604">
-                <a:tc>
-                  <a:txBody>
-                    <a:bodyPr/>
-                    <a:lstStyle/>
-                    <a:p>
-                      <a:r>
-                        <a:rPr lang="de-DE" sz="1600" dirty="0" smtClean="0">
-                          <a:latin typeface="Arial" panose="020B0604020202020204" pitchFamily="34" charset="0"/>
-                          <a:cs typeface="Arial" panose="020B0604020202020204" pitchFamily="34" charset="0"/>
-                        </a:rPr>
-                        <a:t>Design</a:t>
-                      </a:r>
-                      <a:endParaRPr lang="de-DE" sz="1600" dirty="0">
-                        <a:latin typeface="Arial" panose="020B0604020202020204" pitchFamily="34" charset="0"/>
-                        <a:cs typeface="Arial" panose="020B0604020202020204" pitchFamily="34" charset="0"/>
-                      </a:endParaRPr>
-                    </a:p>
-                  </a:txBody>
-                  <a:tcPr/>
-                </a:tc>
-                <a:tc>
-                  <a:txBody>
-                    <a:bodyPr/>
-                    <a:lstStyle/>
-                    <a:p>
-                      <a:pPr marL="285750" indent="-285750">
-                        <a:buFont typeface="Arial" panose="020B0604020202020204" pitchFamily="34" charset="0"/>
-                        <a:buChar char="•"/>
-                      </a:pPr>
-                      <a:endParaRPr lang="de-DE" sz="1600" dirty="0">
-                        <a:latin typeface="Arial" panose="020B0604020202020204" pitchFamily="34" charset="0"/>
-                        <a:cs typeface="Arial" panose="020B0604020202020204" pitchFamily="34" charset="0"/>
-                      </a:endParaRPr>
-                    </a:p>
-                  </a:txBody>
-                  <a:tcPr/>
-                </a:tc>
-              </a:tr>
-              <a:tr h="910682">
-                <a:tc>
-                  <a:txBody>
-                    <a:bodyPr/>
-                    <a:lstStyle/>
-                    <a:p>
-                      <a:r>
-                        <a:rPr lang="de-DE" sz="1600" dirty="0" smtClean="0">
-                          <a:latin typeface="Arial" panose="020B0604020202020204" pitchFamily="34" charset="0"/>
-                          <a:cs typeface="Arial" panose="020B0604020202020204" pitchFamily="34" charset="0"/>
-                        </a:rPr>
-                        <a:t>Backend</a:t>
-                      </a:r>
-                      <a:endParaRPr lang="de-DE" sz="1600" dirty="0">
-                        <a:latin typeface="Arial" panose="020B0604020202020204" pitchFamily="34" charset="0"/>
-                        <a:cs typeface="Arial" panose="020B0604020202020204" pitchFamily="34" charset="0"/>
-                      </a:endParaRPr>
-                    </a:p>
-                  </a:txBody>
-                  <a:tcPr/>
-                </a:tc>
-                <a:tc>
-                  <a:txBody>
-                    <a:bodyPr/>
-                    <a:lstStyle/>
-                    <a:p>
-                      <a:pPr marL="285750" indent="-285750">
-                        <a:buFont typeface="Arial" panose="020B0604020202020204" pitchFamily="34" charset="0"/>
-                        <a:buChar char="•"/>
-                      </a:pPr>
-                      <a:endParaRPr lang="de-DE" sz="1600" dirty="0">
-                        <a:latin typeface="Arial" panose="020B0604020202020204" pitchFamily="34" charset="0"/>
-                        <a:cs typeface="Arial" panose="020B0604020202020204" pitchFamily="34" charset="0"/>
-                      </a:endParaRPr>
-                    </a:p>
-                  </a:txBody>
-                  <a:tcPr/>
-                </a:tc>
-              </a:tr>
-            </a:tbl>
-          </a:graphicData>
-        </a:graphic>
-      </p:graphicFrame>
-      <p:sp>
-        <p:nvSpPr>
-          <p:cNvPr id="5" name="Titel 1"/>
-          <p:cNvSpPr txBox="1">
-            <a:spLocks/>
-          </p:cNvSpPr>
-          <p:nvPr/>
-        </p:nvSpPr>
-        <p:spPr>
-          <a:xfrm>
-            <a:off x="457200" y="274638"/>
-            <a:ext cx="8229600" cy="634082"/>
-          </a:xfrm>
-          <a:prstGeom prst="rect">
-            <a:avLst/>
-          </a:prstGeom>
-        </p:spPr>
-        <p:txBody>
-          <a:bodyPr vert="horz" lIns="91440" tIns="45720" rIns="91440" bIns="45720" rtlCol="0" anchor="ctr">
-            <a:normAutofit/>
-          </a:bodyPr>
-          <a:lstStyle>
-            <a:lvl1pPr algn="ctr" defTabSz="914400" rtl="0" eaLnBrk="1" latinLnBrk="0" hangingPunct="1">
-              <a:spcBef>
-                <a:spcPct val="0"/>
-              </a:spcBef>
-              <a:buNone/>
-              <a:defRPr sz="4400" kern="1200">
-                <a:solidFill>
-                  <a:schemeClr val="tx1"/>
-                </a:solidFill>
-                <a:latin typeface="+mj-lt"/>
-                <a:ea typeface="+mj-ea"/>
-                <a:cs typeface="+mj-cs"/>
-              </a:defRPr>
-            </a:lvl1pPr>
-          </a:lstStyle>
-          <a:p>
-            <a:pPr algn="l"/>
-            <a:r>
-              <a:rPr lang="de-DE" sz="2000" b="1" dirty="0" smtClean="0">
-                <a:latin typeface="Arial" panose="020B0604020202020204" pitchFamily="34" charset="0"/>
-                <a:cs typeface="Arial" panose="020B0604020202020204" pitchFamily="34" charset="0"/>
-              </a:rPr>
-              <a:t>3. </a:t>
-            </a:r>
-            <a:r>
-              <a:rPr lang="de-DE" sz="2000" b="1" dirty="0" smtClean="0">
-                <a:latin typeface="Arial" panose="020B0604020202020204" pitchFamily="34" charset="0"/>
-                <a:cs typeface="Arial" panose="020B0604020202020204" pitchFamily="34" charset="0"/>
-              </a:rPr>
-              <a:t>Erkenntnisse </a:t>
-            </a:r>
-            <a:r>
-              <a:rPr lang="de-DE" sz="2000" dirty="0" smtClean="0">
-                <a:latin typeface="Arial" panose="020B0604020202020204" pitchFamily="34" charset="0"/>
-                <a:cs typeface="Arial" panose="020B0604020202020204" pitchFamily="34" charset="0"/>
-              </a:rPr>
-              <a:t>– Teamübersicht</a:t>
-            </a:r>
-            <a:endParaRPr lang="de-DE" sz="2000" dirty="0">
-              <a:latin typeface="Arial" panose="020B0604020202020204" pitchFamily="34" charset="0"/>
-              <a:cs typeface="Arial" panose="020B0604020202020204" pitchFamily="34" charset="0"/>
-            </a:endParaRPr>
-          </a:p>
-        </p:txBody>
-      </p:sp>
-      <p:sp>
-        <p:nvSpPr>
-          <p:cNvPr id="6" name="Foliennummernplatzhalter 5"/>
-          <p:cNvSpPr>
-            <a:spLocks noGrp="1"/>
-          </p:cNvSpPr>
-          <p:nvPr>
-            <p:ph type="sldNum" sz="quarter" idx="12"/>
-          </p:nvPr>
-        </p:nvSpPr>
-        <p:spPr/>
-        <p:txBody>
-          <a:bodyPr/>
-          <a:lstStyle/>
-          <a:p>
-            <a:fld id="{6C6AE60A-B69C-4790-82F7-3882EDF23186}" type="slidenum">
-              <a:rPr lang="de-DE" smtClean="0"/>
-              <a:t>18</a:t>
-            </a:fld>
-            <a:endParaRPr lang="de-DE"/>
-          </a:p>
-        </p:txBody>
-      </p:sp>
-    </p:spTree>
-    <p:extLst>
-      <p:ext uri="{BB962C8B-B14F-4D97-AF65-F5344CB8AC3E}">
-        <p14:creationId xmlns:p14="http://schemas.microsoft.com/office/powerpoint/2010/main" val="382308294"/>
       </p:ext>
     </p:extLst>
   </p:cSld>

</xml_diff>